<commit_message>
updated with announcement and examples
</commit_message>
<xml_diff>
--- a/slides/On-Campus/10_01_MoreBranching.pptx
+++ b/slides/On-Campus/10_01_MoreBranching.pptx
@@ -5,16 +5,19 @@
     <p:sldMasterId id="2147483648" r:id="rId1"/>
   </p:sldMasterIdLst>
   <p:notesMasterIdLst>
-    <p:notesMasterId r:id="rId6"/>
+    <p:notesMasterId r:id="rId9"/>
   </p:notesMasterIdLst>
   <p:handoutMasterIdLst>
-    <p:handoutMasterId r:id="rId7"/>
+    <p:handoutMasterId r:id="rId10"/>
   </p:handoutMasterIdLst>
   <p:sldIdLst>
     <p:sldId id="257" r:id="rId2"/>
-    <p:sldId id="259" r:id="rId3"/>
-    <p:sldId id="258" r:id="rId4"/>
-    <p:sldId id="260" r:id="rId5"/>
+    <p:sldId id="267" r:id="rId3"/>
+    <p:sldId id="259" r:id="rId4"/>
+    <p:sldId id="268" r:id="rId5"/>
+    <p:sldId id="258" r:id="rId6"/>
+    <p:sldId id="260" r:id="rId7"/>
+    <p:sldId id="269" r:id="rId8"/>
   </p:sldIdLst>
   <p:sldSz cx="13817600" cy="7772400"/>
   <p:notesSz cx="6858000" cy="9144000"/>
@@ -217,7 +220,7 @@
           <a:p>
             <a:fld id="{4D7E51A5-B478-1E40-8CBB-0DAA8831E99D}" type="datetimeFigureOut">
               <a:rPr lang="en-US" smtClean="0"/>
-              <a:t>4/14/20</a:t>
+              <a:t>10/23/2021</a:t>
             </a:fld>
             <a:endParaRPr lang="en-US"/>
           </a:p>
@@ -382,7 +385,7 @@
           <a:p>
             <a:fld id="{D0ED587F-861E-6740-9643-E3DDAE89B8D6}" type="datetimeFigureOut">
               <a:rPr lang="en-US" smtClean="0"/>
-              <a:t>4/14/20</a:t>
+              <a:t>10/23/2021</a:t>
             </a:fld>
             <a:endParaRPr lang="en-US"/>
           </a:p>
@@ -4009,6 +4012,602 @@
 </p:sldLayout>
 </file>
 
+<file path=ppt/slideLayouts/slideLayout25.xml><?xml version="1.0" encoding="utf-8"?>
+<p:sldLayout xmlns:a="http://schemas.openxmlformats.org/drawingml/2006/main" xmlns:r="http://schemas.openxmlformats.org/officeDocument/2006/relationships" xmlns:p="http://schemas.openxmlformats.org/presentationml/2006/main" matchingName="Title and Content">
+  <p:cSld name="1_Title and Content">
+    <p:spTree>
+      <p:nvGrpSpPr>
+        <p:cNvPr id="1" name="Shape 53"/>
+        <p:cNvGrpSpPr/>
+        <p:nvPr/>
+      </p:nvGrpSpPr>
+      <p:grpSpPr>
+        <a:xfrm>
+          <a:off x="0" y="0"/>
+          <a:ext cx="0" cy="0"/>
+          <a:chOff x="0" y="0"/>
+          <a:chExt cx="0" cy="0"/>
+        </a:xfrm>
+      </p:grpSpPr>
+      <p:grpSp>
+        <p:nvGrpSpPr>
+          <p:cNvPr id="54" name="Google Shape;54;p14"/>
+          <p:cNvGrpSpPr/>
+          <p:nvPr/>
+        </p:nvGrpSpPr>
+        <p:grpSpPr>
+          <a:xfrm>
+            <a:off x="0" y="7372875"/>
+            <a:ext cx="13849756" cy="400074"/>
+            <a:chOff x="0" y="7372350"/>
+            <a:chExt cx="13817700" cy="400053"/>
+          </a:xfrm>
+        </p:grpSpPr>
+        <p:sp>
+          <p:nvSpPr>
+            <p:cNvPr id="55" name="Google Shape;55;p14"/>
+            <p:cNvSpPr/>
+            <p:nvPr/>
+          </p:nvSpPr>
+          <p:spPr>
+            <a:xfrm>
+              <a:off x="0" y="7372350"/>
+              <a:ext cx="13817700" cy="399900"/>
+            </a:xfrm>
+            <a:prstGeom prst="rect">
+              <a:avLst/>
+            </a:prstGeom>
+            <a:solidFill>
+              <a:schemeClr val="dk2"/>
+            </a:solidFill>
+            <a:ln>
+              <a:noFill/>
+            </a:ln>
+          </p:spPr>
+          <p:txBody>
+            <a:bodyPr spcFirstLastPara="1" wrap="square" lIns="60500" tIns="30250" rIns="60500" bIns="30250" anchor="ctr" anchorCtr="0">
+              <a:noAutofit/>
+            </a:bodyPr>
+            <a:lstStyle/>
+            <a:p>
+              <a:pPr marL="0" marR="0" lvl="0" indent="0" algn="ctr" rtl="0">
+                <a:spcBef>
+                  <a:spcPts val="0"/>
+                </a:spcBef>
+                <a:spcAft>
+                  <a:spcPts val="0"/>
+                </a:spcAft>
+                <a:buNone/>
+              </a:pPr>
+              <a:endParaRPr sz="1964" b="0" i="0" u="none" strike="noStrike" cap="none">
+                <a:solidFill>
+                  <a:schemeClr val="lt1"/>
+                </a:solidFill>
+                <a:latin typeface="Arial"/>
+                <a:ea typeface="Arial"/>
+                <a:cs typeface="Arial"/>
+                <a:sym typeface="Arial"/>
+              </a:endParaRPr>
+            </a:p>
+          </p:txBody>
+        </p:sp>
+        <p:pic>
+          <p:nvPicPr>
+            <p:cNvPr id="56" name="Google Shape;56;p14"/>
+            <p:cNvPicPr preferRelativeResize="0"/>
+            <p:nvPr/>
+          </p:nvPicPr>
+          <p:blipFill rotWithShape="1">
+            <a:blip r:embed="rId2">
+              <a:alphaModFix/>
+            </a:blip>
+            <a:srcRect/>
+            <a:stretch/>
+          </p:blipFill>
+          <p:spPr>
+            <a:xfrm>
+              <a:off x="152257" y="7372351"/>
+              <a:ext cx="1788558" cy="400050"/>
+            </a:xfrm>
+            <a:prstGeom prst="rect">
+              <a:avLst/>
+            </a:prstGeom>
+            <a:noFill/>
+            <a:ln>
+              <a:noFill/>
+            </a:ln>
+          </p:spPr>
+        </p:pic>
+        <p:sp>
+          <p:nvSpPr>
+            <p:cNvPr id="57" name="Google Shape;57;p14"/>
+            <p:cNvSpPr/>
+            <p:nvPr/>
+          </p:nvSpPr>
+          <p:spPr>
+            <a:xfrm>
+              <a:off x="0" y="7372351"/>
+              <a:ext cx="13817700" cy="399900"/>
+            </a:xfrm>
+            <a:prstGeom prst="rect">
+              <a:avLst/>
+            </a:prstGeom>
+            <a:solidFill>
+              <a:schemeClr val="dk2"/>
+            </a:solidFill>
+            <a:ln>
+              <a:noFill/>
+            </a:ln>
+          </p:spPr>
+          <p:txBody>
+            <a:bodyPr spcFirstLastPara="1" wrap="square" lIns="60500" tIns="30250" rIns="60500" bIns="30250" anchor="ctr" anchorCtr="0">
+              <a:noAutofit/>
+            </a:bodyPr>
+            <a:lstStyle/>
+            <a:p>
+              <a:pPr marL="0" marR="0" lvl="0" indent="0" algn="ctr" rtl="0">
+                <a:spcBef>
+                  <a:spcPts val="0"/>
+                </a:spcBef>
+                <a:spcAft>
+                  <a:spcPts val="0"/>
+                </a:spcAft>
+                <a:buNone/>
+              </a:pPr>
+              <a:endParaRPr sz="1964" b="0" i="0" u="none" strike="noStrike" cap="none">
+                <a:solidFill>
+                  <a:schemeClr val="lt1"/>
+                </a:solidFill>
+                <a:latin typeface="Arial"/>
+                <a:ea typeface="Arial"/>
+                <a:cs typeface="Arial"/>
+                <a:sym typeface="Arial"/>
+              </a:endParaRPr>
+            </a:p>
+          </p:txBody>
+        </p:sp>
+        <p:pic>
+          <p:nvPicPr>
+            <p:cNvPr id="58" name="Google Shape;58;p14"/>
+            <p:cNvPicPr preferRelativeResize="0"/>
+            <p:nvPr/>
+          </p:nvPicPr>
+          <p:blipFill rotWithShape="1">
+            <a:blip r:embed="rId2">
+              <a:alphaModFix/>
+            </a:blip>
+            <a:srcRect/>
+            <a:stretch/>
+          </p:blipFill>
+          <p:spPr>
+            <a:xfrm>
+              <a:off x="152257" y="7372352"/>
+              <a:ext cx="1788558" cy="400050"/>
+            </a:xfrm>
+            <a:prstGeom prst="rect">
+              <a:avLst/>
+            </a:prstGeom>
+            <a:noFill/>
+            <a:ln>
+              <a:noFill/>
+            </a:ln>
+          </p:spPr>
+        </p:pic>
+      </p:grpSp>
+      <p:sp>
+        <p:nvSpPr>
+          <p:cNvPr id="59" name="Google Shape;59;p14"/>
+          <p:cNvSpPr txBox="1">
+            <a:spLocks noGrp="1"/>
+          </p:cNvSpPr>
+          <p:nvPr>
+            <p:ph type="title"/>
+          </p:nvPr>
+        </p:nvSpPr>
+        <p:spPr>
+          <a:xfrm>
+            <a:off x="628075" y="905258"/>
+            <a:ext cx="12561413" cy="1015467"/>
+          </a:xfrm>
+          <a:prstGeom prst="rect">
+            <a:avLst/>
+          </a:prstGeom>
+          <a:noFill/>
+          <a:ln>
+            <a:noFill/>
+          </a:ln>
+        </p:spPr>
+        <p:txBody>
+          <a:bodyPr spcFirstLastPara="1" wrap="square" lIns="60500" tIns="60500" rIns="60500" bIns="60500" anchor="b" anchorCtr="0">
+            <a:noAutofit/>
+          </a:bodyPr>
+          <a:lstStyle>
+            <a:lvl1pPr marR="0" lvl="0" algn="l" rtl="0">
+              <a:spcBef>
+                <a:spcPts val="0"/>
+              </a:spcBef>
+              <a:spcAft>
+                <a:spcPts val="0"/>
+              </a:spcAft>
+              <a:buClr>
+                <a:schemeClr val="dk2"/>
+              </a:buClr>
+              <a:buSzPts val="3600"/>
+              <a:buFont typeface="Arial"/>
+              <a:buNone/>
+              <a:defRPr sz="5440" b="0" i="0" u="none" strike="noStrike" cap="none">
+                <a:solidFill>
+                  <a:schemeClr val="dk2"/>
+                </a:solidFill>
+                <a:latin typeface="Arial"/>
+                <a:ea typeface="Arial"/>
+                <a:cs typeface="Arial"/>
+                <a:sym typeface="Arial"/>
+              </a:defRPr>
+            </a:lvl1pPr>
+            <a:lvl2pPr lvl="1" rtl="0">
+              <a:spcBef>
+                <a:spcPts val="0"/>
+              </a:spcBef>
+              <a:spcAft>
+                <a:spcPts val="0"/>
+              </a:spcAft>
+              <a:buSzPts val="900"/>
+              <a:buNone/>
+              <a:defRPr sz="1813"/>
+            </a:lvl2pPr>
+            <a:lvl3pPr lvl="2" rtl="0">
+              <a:spcBef>
+                <a:spcPts val="0"/>
+              </a:spcBef>
+              <a:spcAft>
+                <a:spcPts val="0"/>
+              </a:spcAft>
+              <a:buSzPts val="900"/>
+              <a:buNone/>
+              <a:defRPr sz="1813"/>
+            </a:lvl3pPr>
+            <a:lvl4pPr lvl="3" rtl="0">
+              <a:spcBef>
+                <a:spcPts val="0"/>
+              </a:spcBef>
+              <a:spcAft>
+                <a:spcPts val="0"/>
+              </a:spcAft>
+              <a:buSzPts val="900"/>
+              <a:buNone/>
+              <a:defRPr sz="1813"/>
+            </a:lvl4pPr>
+            <a:lvl5pPr lvl="4" rtl="0">
+              <a:spcBef>
+                <a:spcPts val="0"/>
+              </a:spcBef>
+              <a:spcAft>
+                <a:spcPts val="0"/>
+              </a:spcAft>
+              <a:buSzPts val="900"/>
+              <a:buNone/>
+              <a:defRPr sz="1813"/>
+            </a:lvl5pPr>
+            <a:lvl6pPr lvl="5" rtl="0">
+              <a:spcBef>
+                <a:spcPts val="0"/>
+              </a:spcBef>
+              <a:spcAft>
+                <a:spcPts val="0"/>
+              </a:spcAft>
+              <a:buSzPts val="900"/>
+              <a:buNone/>
+              <a:defRPr sz="1813"/>
+            </a:lvl6pPr>
+            <a:lvl7pPr lvl="6" rtl="0">
+              <a:spcBef>
+                <a:spcPts val="0"/>
+              </a:spcBef>
+              <a:spcAft>
+                <a:spcPts val="0"/>
+              </a:spcAft>
+              <a:buSzPts val="900"/>
+              <a:buNone/>
+              <a:defRPr sz="1813"/>
+            </a:lvl7pPr>
+            <a:lvl8pPr lvl="7" rtl="0">
+              <a:spcBef>
+                <a:spcPts val="0"/>
+              </a:spcBef>
+              <a:spcAft>
+                <a:spcPts val="0"/>
+              </a:spcAft>
+              <a:buSzPts val="900"/>
+              <a:buNone/>
+              <a:defRPr sz="1813"/>
+            </a:lvl8pPr>
+            <a:lvl9pPr lvl="8" rtl="0">
+              <a:spcBef>
+                <a:spcPts val="0"/>
+              </a:spcBef>
+              <a:spcAft>
+                <a:spcPts val="0"/>
+              </a:spcAft>
+              <a:buSzPts val="900"/>
+              <a:buNone/>
+              <a:defRPr sz="1813"/>
+            </a:lvl9pPr>
+          </a:lstStyle>
+          <a:p>
+            <a:endParaRPr/>
+          </a:p>
+        </p:txBody>
+      </p:sp>
+      <p:sp>
+        <p:nvSpPr>
+          <p:cNvPr id="60" name="Google Shape;60;p14"/>
+          <p:cNvSpPr txBox="1">
+            <a:spLocks noGrp="1"/>
+          </p:cNvSpPr>
+          <p:nvPr>
+            <p:ph type="body" idx="1"/>
+          </p:nvPr>
+        </p:nvSpPr>
+        <p:spPr>
+          <a:xfrm>
+            <a:off x="628075" y="2487883"/>
+            <a:ext cx="12561413" cy="2015520"/>
+          </a:xfrm>
+          <a:prstGeom prst="rect">
+            <a:avLst/>
+          </a:prstGeom>
+          <a:noFill/>
+          <a:ln>
+            <a:noFill/>
+          </a:ln>
+        </p:spPr>
+        <p:txBody>
+          <a:bodyPr spcFirstLastPara="1" wrap="square" lIns="60500" tIns="60500" rIns="60500" bIns="60500" anchor="t" anchorCtr="0">
+            <a:noAutofit/>
+          </a:bodyPr>
+          <a:lstStyle>
+            <a:lvl1pPr marL="690875" marR="0" lvl="0" indent="-460583" algn="l" rtl="0">
+              <a:lnSpc>
+                <a:spcPct val="120000"/>
+              </a:lnSpc>
+              <a:spcBef>
+                <a:spcPts val="604"/>
+              </a:spcBef>
+              <a:spcAft>
+                <a:spcPts val="0"/>
+              </a:spcAft>
+              <a:buClr>
+                <a:schemeClr val="dk1"/>
+              </a:buClr>
+              <a:buSzPts val="1200"/>
+              <a:buFont typeface="Arial"/>
+              <a:buChar char="•"/>
+              <a:defRPr sz="1813" b="0" i="0" u="none" strike="noStrike" cap="none">
+                <a:solidFill>
+                  <a:schemeClr val="dk1"/>
+                </a:solidFill>
+                <a:latin typeface="Proxima Nova"/>
+                <a:ea typeface="Proxima Nova"/>
+                <a:cs typeface="Proxima Nova"/>
+                <a:sym typeface="Proxima Nova"/>
+              </a:defRPr>
+            </a:lvl1pPr>
+            <a:lvl2pPr marL="1381750" marR="0" lvl="1" indent="-450988" algn="l" rtl="0">
+              <a:lnSpc>
+                <a:spcPct val="120000"/>
+              </a:lnSpc>
+              <a:spcBef>
+                <a:spcPts val="604"/>
+              </a:spcBef>
+              <a:spcAft>
+                <a:spcPts val="0"/>
+              </a:spcAft>
+              <a:buClr>
+                <a:schemeClr val="dk1"/>
+              </a:buClr>
+              <a:buSzPts val="1100"/>
+              <a:buFont typeface="Arial"/>
+              <a:buChar char="–"/>
+              <a:defRPr sz="1662" b="0" i="0" u="none" strike="noStrike" cap="none">
+                <a:solidFill>
+                  <a:schemeClr val="dk1"/>
+                </a:solidFill>
+                <a:latin typeface="Proxima Nova"/>
+                <a:ea typeface="Proxima Nova"/>
+                <a:cs typeface="Proxima Nova"/>
+                <a:sym typeface="Proxima Nova"/>
+              </a:defRPr>
+            </a:lvl2pPr>
+            <a:lvl3pPr marL="2072625" marR="0" lvl="2" indent="-450988" algn="l" rtl="0">
+              <a:lnSpc>
+                <a:spcPct val="120000"/>
+              </a:lnSpc>
+              <a:spcBef>
+                <a:spcPts val="604"/>
+              </a:spcBef>
+              <a:spcAft>
+                <a:spcPts val="0"/>
+              </a:spcAft>
+              <a:buClr>
+                <a:schemeClr val="dk1"/>
+              </a:buClr>
+              <a:buSzPts val="1100"/>
+              <a:buFont typeface="Arial"/>
+              <a:buChar char="•"/>
+              <a:defRPr sz="1662" b="0" i="0" u="none" strike="noStrike" cap="none">
+                <a:solidFill>
+                  <a:schemeClr val="dk1"/>
+                </a:solidFill>
+                <a:latin typeface="Proxima Nova"/>
+                <a:ea typeface="Proxima Nova"/>
+                <a:cs typeface="Proxima Nova"/>
+                <a:sym typeface="Proxima Nova"/>
+              </a:defRPr>
+            </a:lvl3pPr>
+            <a:lvl4pPr marL="2763500" marR="0" lvl="3" indent="-450988" algn="l" rtl="0">
+              <a:lnSpc>
+                <a:spcPct val="120000"/>
+              </a:lnSpc>
+              <a:spcBef>
+                <a:spcPts val="604"/>
+              </a:spcBef>
+              <a:spcAft>
+                <a:spcPts val="0"/>
+              </a:spcAft>
+              <a:buClr>
+                <a:schemeClr val="dk1"/>
+              </a:buClr>
+              <a:buSzPts val="1100"/>
+              <a:buFont typeface="Arial"/>
+              <a:buChar char="–"/>
+              <a:defRPr sz="1662" b="0" i="0" u="none" strike="noStrike" cap="none">
+                <a:solidFill>
+                  <a:schemeClr val="dk1"/>
+                </a:solidFill>
+                <a:latin typeface="Proxima Nova"/>
+                <a:ea typeface="Proxima Nova"/>
+                <a:cs typeface="Proxima Nova"/>
+                <a:sym typeface="Proxima Nova"/>
+              </a:defRPr>
+            </a:lvl4pPr>
+            <a:lvl5pPr marL="3454375" marR="0" lvl="4" indent="-450988" algn="l" rtl="0">
+              <a:spcBef>
+                <a:spcPts val="604"/>
+              </a:spcBef>
+              <a:spcAft>
+                <a:spcPts val="0"/>
+              </a:spcAft>
+              <a:buClr>
+                <a:schemeClr val="dk1"/>
+              </a:buClr>
+              <a:buSzPts val="1100"/>
+              <a:buFont typeface="Arial"/>
+              <a:buChar char="»"/>
+              <a:defRPr sz="1662" b="0" i="0" u="none" strike="noStrike" cap="none">
+                <a:solidFill>
+                  <a:schemeClr val="dk1"/>
+                </a:solidFill>
+                <a:latin typeface="Source Sans Pro"/>
+                <a:ea typeface="Source Sans Pro"/>
+                <a:cs typeface="Source Sans Pro"/>
+                <a:sym typeface="Source Sans Pro"/>
+              </a:defRPr>
+            </a:lvl5pPr>
+            <a:lvl6pPr marL="4145250" marR="0" lvl="5" indent="-537347" algn="l" rtl="0">
+              <a:spcBef>
+                <a:spcPts val="604"/>
+              </a:spcBef>
+              <a:spcAft>
+                <a:spcPts val="0"/>
+              </a:spcAft>
+              <a:buClr>
+                <a:schemeClr val="dk1"/>
+              </a:buClr>
+              <a:buSzPts val="2000"/>
+              <a:buFont typeface="Arial"/>
+              <a:buChar char="•"/>
+              <a:defRPr sz="3022" b="0" i="0" u="none" strike="noStrike" cap="none">
+                <a:solidFill>
+                  <a:schemeClr val="dk1"/>
+                </a:solidFill>
+                <a:latin typeface="Arial"/>
+                <a:ea typeface="Arial"/>
+                <a:cs typeface="Arial"/>
+                <a:sym typeface="Arial"/>
+              </a:defRPr>
+            </a:lvl6pPr>
+            <a:lvl7pPr marL="4836124" marR="0" lvl="6" indent="-537347" algn="l" rtl="0">
+              <a:spcBef>
+                <a:spcPts val="604"/>
+              </a:spcBef>
+              <a:spcAft>
+                <a:spcPts val="0"/>
+              </a:spcAft>
+              <a:buClr>
+                <a:schemeClr val="dk1"/>
+              </a:buClr>
+              <a:buSzPts val="2000"/>
+              <a:buFont typeface="Arial"/>
+              <a:buChar char="•"/>
+              <a:defRPr sz="3022" b="0" i="0" u="none" strike="noStrike" cap="none">
+                <a:solidFill>
+                  <a:schemeClr val="dk1"/>
+                </a:solidFill>
+                <a:latin typeface="Arial"/>
+                <a:ea typeface="Arial"/>
+                <a:cs typeface="Arial"/>
+                <a:sym typeface="Arial"/>
+              </a:defRPr>
+            </a:lvl7pPr>
+            <a:lvl8pPr marL="5526999" marR="0" lvl="7" indent="-537347" algn="l" rtl="0">
+              <a:spcBef>
+                <a:spcPts val="604"/>
+              </a:spcBef>
+              <a:spcAft>
+                <a:spcPts val="0"/>
+              </a:spcAft>
+              <a:buClr>
+                <a:schemeClr val="dk1"/>
+              </a:buClr>
+              <a:buSzPts val="2000"/>
+              <a:buFont typeface="Arial"/>
+              <a:buChar char="•"/>
+              <a:defRPr sz="3022" b="0" i="0" u="none" strike="noStrike" cap="none">
+                <a:solidFill>
+                  <a:schemeClr val="dk1"/>
+                </a:solidFill>
+                <a:latin typeface="Arial"/>
+                <a:ea typeface="Arial"/>
+                <a:cs typeface="Arial"/>
+                <a:sym typeface="Arial"/>
+              </a:defRPr>
+            </a:lvl8pPr>
+            <a:lvl9pPr marL="6217874" marR="0" lvl="8" indent="-537347" algn="l" rtl="0">
+              <a:spcBef>
+                <a:spcPts val="604"/>
+              </a:spcBef>
+              <a:spcAft>
+                <a:spcPts val="0"/>
+              </a:spcAft>
+              <a:buClr>
+                <a:schemeClr val="dk1"/>
+              </a:buClr>
+              <a:buSzPts val="2000"/>
+              <a:buFont typeface="Arial"/>
+              <a:buChar char="•"/>
+              <a:defRPr sz="3022" b="0" i="0" u="none" strike="noStrike" cap="none">
+                <a:solidFill>
+                  <a:schemeClr val="dk1"/>
+                </a:solidFill>
+                <a:latin typeface="Arial"/>
+                <a:ea typeface="Arial"/>
+                <a:cs typeface="Arial"/>
+                <a:sym typeface="Arial"/>
+              </a:defRPr>
+            </a:lvl9pPr>
+          </a:lstStyle>
+          <a:p>
+            <a:endParaRPr/>
+          </a:p>
+        </p:txBody>
+      </p:sp>
+    </p:spTree>
+    <p:extLst>
+      <p:ext uri="{BB962C8B-B14F-4D97-AF65-F5344CB8AC3E}">
+        <p14:creationId xmlns:p14="http://schemas.microsoft.com/office/powerpoint/2010/main" val="3961061512"/>
+      </p:ext>
+    </p:extLst>
+  </p:cSld>
+  <p:clrMapOvr>
+    <a:masterClrMapping/>
+  </p:clrMapOvr>
+  <p:transition>
+    <p:fade/>
+  </p:transition>
+</p:sldLayout>
+</file>
+
 <file path=ppt/slideLayouts/slideLayout3.xml><?xml version="1.0" encoding="utf-8"?>
 <p:sldLayout xmlns:a="http://schemas.openxmlformats.org/drawingml/2006/main" xmlns:r="http://schemas.openxmlformats.org/officeDocument/2006/relationships" xmlns:p="http://schemas.openxmlformats.org/presentationml/2006/main" preserve="1" userDrawn="1">
   <p:cSld name="Title Green Ram CSU">
@@ -6314,6 +6913,7 @@
     <p:sldLayoutId id="2147483677" r:id="rId22"/>
     <p:sldLayoutId id="2147483692" r:id="rId23"/>
     <p:sldLayoutId id="2147483672" r:id="rId24"/>
+    <p:sldLayoutId id="2147483693" r:id="rId25"/>
   </p:sldLayoutIdLst>
   <mc:AlternateContent xmlns:mc="http://schemas.openxmlformats.org/markup-compatibility/2006" xmlns:p14="http://schemas.microsoft.com/office/powerpoint/2010/main">
     <mc:Choice Requires="p14">
@@ -6725,6 +7325,336 @@
       </p:grpSpPr>
       <p:sp>
         <p:nvSpPr>
+          <p:cNvPr id="4" name="Title 3">
+            <a:extLst>
+              <a:ext uri="{FF2B5EF4-FFF2-40B4-BE49-F238E27FC236}">
+                <a16:creationId xmlns:a16="http://schemas.microsoft.com/office/drawing/2014/main" id="{119AD8F2-D5DB-A84B-A5B3-F7935E3E6D1D}"/>
+              </a:ext>
+            </a:extLst>
+          </p:cNvPr>
+          <p:cNvSpPr>
+            <a:spLocks noGrp="1"/>
+          </p:cNvSpPr>
+          <p:nvPr>
+            <p:ph type="title"/>
+          </p:nvPr>
+        </p:nvSpPr>
+        <p:spPr>
+          <a:xfrm>
+            <a:off x="628076" y="607804"/>
+            <a:ext cx="5642096" cy="916848"/>
+          </a:xfrm>
+        </p:spPr>
+        <p:txBody>
+          <a:bodyPr/>
+          <a:lstStyle/>
+          <a:p>
+            <a:r>
+              <a:rPr lang="en-US" dirty="0"/>
+              <a:t>Announcements</a:t>
+            </a:r>
+          </a:p>
+        </p:txBody>
+      </p:sp>
+      <p:sp>
+        <p:nvSpPr>
+          <p:cNvPr id="5" name="Text Placeholder 4">
+            <a:extLst>
+              <a:ext uri="{FF2B5EF4-FFF2-40B4-BE49-F238E27FC236}">
+                <a16:creationId xmlns:a16="http://schemas.microsoft.com/office/drawing/2014/main" id="{1BBD0DB5-379A-304F-9307-E7B1A89B08F7}"/>
+              </a:ext>
+            </a:extLst>
+          </p:cNvPr>
+          <p:cNvSpPr>
+            <a:spLocks noGrp="1"/>
+          </p:cNvSpPr>
+          <p:nvPr>
+            <p:ph type="body" idx="1"/>
+          </p:nvPr>
+        </p:nvSpPr>
+        <p:spPr>
+          <a:xfrm>
+            <a:off x="628076" y="1647163"/>
+            <a:ext cx="8846458" cy="2659023"/>
+          </a:xfrm>
+        </p:spPr>
+        <p:txBody>
+          <a:bodyPr/>
+          <a:lstStyle/>
+          <a:p>
+            <a:pPr marL="930762" lvl="1" indent="0">
+              <a:buNone/>
+            </a:pPr>
+            <a:endParaRPr lang="en-US" dirty="0"/>
+          </a:p>
+          <a:p>
+            <a:r>
+              <a:rPr lang="en-US" dirty="0"/>
+              <a:t>Make sure to go to labs!! Even if you can’t work on the current lab, they are good for helping you get caught up.</a:t>
+            </a:r>
+          </a:p>
+          <a:p>
+            <a:endParaRPr lang="en-US" dirty="0"/>
+          </a:p>
+          <a:p>
+            <a:r>
+              <a:rPr lang="en-US" dirty="0"/>
+              <a:t>Help Session with Andrew</a:t>
+            </a:r>
+          </a:p>
+          <a:p>
+            <a:pPr marL="230292" indent="0">
+              <a:buNone/>
+            </a:pPr>
+            <a:r>
+              <a:rPr lang="en-US" b="1" dirty="0"/>
+              <a:t>	Monday</a:t>
+            </a:r>
+            <a:endParaRPr lang="en-US" dirty="0"/>
+          </a:p>
+          <a:p>
+            <a:pPr marL="230292" indent="0">
+              <a:buNone/>
+            </a:pPr>
+            <a:r>
+              <a:rPr lang="en-US" b="1" dirty="0"/>
+              <a:t>	1:30-2:50 PM</a:t>
+            </a:r>
+            <a:endParaRPr lang="en-US" dirty="0"/>
+          </a:p>
+          <a:p>
+            <a:pPr marL="230292" indent="0">
+              <a:buNone/>
+            </a:pPr>
+            <a:r>
+              <a:rPr lang="en-US" b="1" dirty="0"/>
+              <a:t>	Computer Science Building - 315 (third floor lab)</a:t>
+            </a:r>
+            <a:endParaRPr lang="en-US" dirty="0"/>
+          </a:p>
+        </p:txBody>
+      </p:sp>
+      <p:sp>
+        <p:nvSpPr>
+          <p:cNvPr id="6" name="TextBox 5">
+            <a:extLst>
+              <a:ext uri="{FF2B5EF4-FFF2-40B4-BE49-F238E27FC236}">
+                <a16:creationId xmlns:a16="http://schemas.microsoft.com/office/drawing/2014/main" id="{32A3B87A-BBC0-704B-AC99-3984206450D5}"/>
+              </a:ext>
+            </a:extLst>
+          </p:cNvPr>
+          <p:cNvSpPr txBox="1"/>
+          <p:nvPr/>
+        </p:nvSpPr>
+        <p:spPr>
+          <a:xfrm>
+            <a:off x="9744412" y="2150737"/>
+            <a:ext cx="3892958" cy="1487523"/>
+          </a:xfrm>
+          <a:prstGeom prst="rect">
+            <a:avLst/>
+          </a:prstGeom>
+          <a:noFill/>
+        </p:spPr>
+        <p:txBody>
+          <a:bodyPr wrap="square" rtlCol="0">
+            <a:spAutoFit/>
+          </a:bodyPr>
+          <a:lstStyle/>
+          <a:p>
+            <a:r>
+              <a:rPr lang="en-US" sz="3022" dirty="0" err="1"/>
+              <a:t>Todo</a:t>
+            </a:r>
+            <a:r>
+              <a:rPr lang="en-US" sz="3022" dirty="0"/>
+              <a:t>:</a:t>
+            </a:r>
+          </a:p>
+          <a:p>
+            <a:r>
+              <a:rPr lang="en-US" sz="3022" dirty="0"/>
+              <a:t>Practical 4 – Continue to work on it</a:t>
+            </a:r>
+          </a:p>
+        </p:txBody>
+      </p:sp>
+      <p:sp>
+        <p:nvSpPr>
+          <p:cNvPr id="7" name="TextBox 6">
+            <a:extLst>
+              <a:ext uri="{FF2B5EF4-FFF2-40B4-BE49-F238E27FC236}">
+                <a16:creationId xmlns:a16="http://schemas.microsoft.com/office/drawing/2014/main" id="{BF16D510-BC74-4FA5-AFD2-193B039115A5}"/>
+              </a:ext>
+            </a:extLst>
+          </p:cNvPr>
+          <p:cNvSpPr txBox="1"/>
+          <p:nvPr/>
+        </p:nvSpPr>
+        <p:spPr>
+          <a:xfrm>
+            <a:off x="7228114" y="362857"/>
+            <a:ext cx="6125029" cy="1015663"/>
+          </a:xfrm>
+          <a:prstGeom prst="rect">
+            <a:avLst/>
+          </a:prstGeom>
+          <a:solidFill>
+            <a:schemeClr val="accent2"/>
+          </a:solidFill>
+        </p:spPr>
+        <p:txBody>
+          <a:bodyPr wrap="square" rtlCol="0">
+            <a:spAutoFit/>
+          </a:bodyPr>
+          <a:lstStyle/>
+          <a:p>
+            <a:r>
+              <a:rPr lang="en-US" b="1" dirty="0"/>
+              <a:t>Opening Question: </a:t>
+            </a:r>
+          </a:p>
+          <a:p>
+            <a:r>
+              <a:rPr lang="en-US" dirty="0"/>
+              <a:t>How comfortable are you with the knowledge checks that use complex Boolean logic? (&amp;&amp;, ||, </a:t>
+            </a:r>
+            <a:r>
+              <a:rPr lang="en-US" dirty="0" err="1"/>
+              <a:t>etc</a:t>
+            </a:r>
+            <a:r>
+              <a:rPr lang="en-US" dirty="0"/>
+              <a:t>)</a:t>
+            </a:r>
+          </a:p>
+        </p:txBody>
+      </p:sp>
+      <p:sp>
+        <p:nvSpPr>
+          <p:cNvPr id="8" name="TextBox 7">
+            <a:extLst>
+              <a:ext uri="{FF2B5EF4-FFF2-40B4-BE49-F238E27FC236}">
+                <a16:creationId xmlns:a16="http://schemas.microsoft.com/office/drawing/2014/main" id="{609124F5-A5F0-4B6E-BE4C-AE86713EE85D}"/>
+              </a:ext>
+            </a:extLst>
+          </p:cNvPr>
+          <p:cNvSpPr txBox="1"/>
+          <p:nvPr/>
+        </p:nvSpPr>
+        <p:spPr>
+          <a:xfrm>
+            <a:off x="628075" y="5591807"/>
+            <a:ext cx="12057411" cy="1754326"/>
+          </a:xfrm>
+          <a:prstGeom prst="rect">
+            <a:avLst/>
+          </a:prstGeom>
+          <a:noFill/>
+          <a:ln>
+            <a:solidFill>
+              <a:schemeClr val="accent5"/>
+            </a:solidFill>
+          </a:ln>
+        </p:spPr>
+        <p:txBody>
+          <a:bodyPr wrap="square">
+            <a:spAutoFit/>
+          </a:bodyPr>
+          <a:lstStyle/>
+          <a:p>
+            <a:r>
+              <a:rPr lang="en-US" sz="1800" dirty="0"/>
+              <a:t>CS 165 – Next Course In Sequence (also 201 is popular with 165)</a:t>
+            </a:r>
+          </a:p>
+          <a:p>
+            <a:pPr marL="342900" indent="-342900">
+              <a:buFont typeface="Arial" panose="020B0604020202020204" pitchFamily="34" charset="0"/>
+              <a:buChar char="•"/>
+            </a:pPr>
+            <a:r>
+              <a:rPr lang="en-US" sz="1800" dirty="0"/>
+              <a:t>CO Jobs Report 2021 – 77% of *all* new jobs in Colorado require programming</a:t>
+            </a:r>
+          </a:p>
+          <a:p>
+            <a:pPr marL="342900" indent="-342900">
+              <a:buFont typeface="Arial" panose="020B0604020202020204" pitchFamily="34" charset="0"/>
+              <a:buChar char="•"/>
+            </a:pPr>
+            <a:r>
+              <a:rPr lang="en-US" sz="1800" dirty="0"/>
+              <a:t>60% of all STEM jobs requires *advanced* (200-300 level) </a:t>
+            </a:r>
+          </a:p>
+          <a:p>
+            <a:pPr marL="342900" indent="-342900">
+              <a:buFont typeface="Arial" panose="020B0604020202020204" pitchFamily="34" charset="0"/>
+              <a:buChar char="•"/>
+            </a:pPr>
+            <a:r>
+              <a:rPr lang="en-US" sz="1800" dirty="0"/>
+              <a:t>31% of all Bachelor of Arts degree titled jobs also required coding skills </a:t>
+            </a:r>
+          </a:p>
+          <a:p>
+            <a:pPr marL="342900" indent="-342900">
+              <a:buFont typeface="Arial" panose="020B0604020202020204" pitchFamily="34" charset="0"/>
+              <a:buChar char="•"/>
+            </a:pPr>
+            <a:r>
+              <a:rPr lang="en-US" sz="1800" dirty="0"/>
+              <a:t>2016 Report found on average jobs that require coding skills paid $22,000 more</a:t>
+            </a:r>
+          </a:p>
+          <a:p>
+            <a:pPr marL="342900" indent="-342900">
+              <a:buFont typeface="Arial" panose="020B0604020202020204" pitchFamily="34" charset="0"/>
+              <a:buChar char="•"/>
+            </a:pPr>
+            <a:r>
+              <a:rPr lang="en-US" sz="1800" dirty="0"/>
+              <a:t>Math and Stats majors, at least consider CS 220 (Discrete Structures) – substitutes in your program requirements</a:t>
+            </a:r>
+          </a:p>
+        </p:txBody>
+      </p:sp>
+    </p:spTree>
+    <p:extLst>
+      <p:ext uri="{BB962C8B-B14F-4D97-AF65-F5344CB8AC3E}">
+        <p14:creationId xmlns:p14="http://schemas.microsoft.com/office/powerpoint/2010/main" val="926474781"/>
+      </p:ext>
+    </p:extLst>
+  </p:cSld>
+  <p:clrMapOvr>
+    <a:masterClrMapping/>
+  </p:clrMapOvr>
+  <p:transition>
+    <p:fade/>
+  </p:transition>
+</p:sld>
+</file>
+
+<file path=ppt/slides/slide3.xml><?xml version="1.0" encoding="utf-8"?>
+<p:sld xmlns:a="http://schemas.openxmlformats.org/drawingml/2006/main" xmlns:r="http://schemas.openxmlformats.org/officeDocument/2006/relationships" xmlns:p="http://schemas.openxmlformats.org/presentationml/2006/main">
+  <p:cSld>
+    <p:spTree>
+      <p:nvGrpSpPr>
+        <p:cNvPr id="1" name=""/>
+        <p:cNvGrpSpPr/>
+        <p:nvPr/>
+      </p:nvGrpSpPr>
+      <p:grpSpPr>
+        <a:xfrm>
+          <a:off x="0" y="0"/>
+          <a:ext cx="0" cy="0"/>
+          <a:chOff x="0" y="0"/>
+          <a:chExt cx="0" cy="0"/>
+        </a:xfrm>
+      </p:grpSpPr>
+      <p:sp>
+        <p:nvSpPr>
           <p:cNvPr id="2" name="Title 1">
             <a:extLst>
               <a:ext uri="{FF2B5EF4-FFF2-40B4-BE49-F238E27FC236}">
@@ -7890,7 +8820,7 @@
                             </p:stCondLst>
                             <p:childTnLst>
                               <p:par>
-                                <p:cTn id="5" presetID="53" presetClass="entr" presetSubtype="16" fill="hold" nodeType="clickEffect">
+                                <p:cTn id="5" presetID="10" presetClass="entr" presetSubtype="0" fill="hold" grpId="0" nodeType="clickEffect">
                                   <p:stCondLst>
                                     <p:cond delay="0"/>
                                   </p:stCondLst>
@@ -7898,6 +8828,94 @@
                                     <p:set>
                                       <p:cBhvr>
                                         <p:cTn id="6" dur="1" fill="hold">
+                                          <p:stCondLst>
+                                            <p:cond delay="0"/>
+                                          </p:stCondLst>
+                                        </p:cTn>
+                                        <p:tgtEl>
+                                          <p:spTgt spid="5"/>
+                                        </p:tgtEl>
+                                        <p:attrNameLst>
+                                          <p:attrName>style.visibility</p:attrName>
+                                        </p:attrNameLst>
+                                      </p:cBhvr>
+                                      <p:to>
+                                        <p:strVal val="visible"/>
+                                      </p:to>
+                                    </p:set>
+                                    <p:animEffect transition="in" filter="fade">
+                                      <p:cBhvr>
+                                        <p:cTn id="7" dur="500"/>
+                                        <p:tgtEl>
+                                          <p:spTgt spid="5"/>
+                                        </p:tgtEl>
+                                      </p:cBhvr>
+                                    </p:animEffect>
+                                  </p:childTnLst>
+                                </p:cTn>
+                              </p:par>
+                              <p:par>
+                                <p:cTn id="8" presetID="10" presetClass="entr" presetSubtype="0" fill="hold" grpId="0" nodeType="withEffect">
+                                  <p:stCondLst>
+                                    <p:cond delay="0"/>
+                                  </p:stCondLst>
+                                  <p:childTnLst>
+                                    <p:set>
+                                      <p:cBhvr>
+                                        <p:cTn id="9" dur="1" fill="hold">
+                                          <p:stCondLst>
+                                            <p:cond delay="0"/>
+                                          </p:stCondLst>
+                                        </p:cTn>
+                                        <p:tgtEl>
+                                          <p:spTgt spid="4"/>
+                                        </p:tgtEl>
+                                        <p:attrNameLst>
+                                          <p:attrName>style.visibility</p:attrName>
+                                        </p:attrNameLst>
+                                      </p:cBhvr>
+                                      <p:to>
+                                        <p:strVal val="visible"/>
+                                      </p:to>
+                                    </p:set>
+                                    <p:animEffect transition="in" filter="fade">
+                                      <p:cBhvr>
+                                        <p:cTn id="10" dur="500"/>
+                                        <p:tgtEl>
+                                          <p:spTgt spid="4"/>
+                                        </p:tgtEl>
+                                      </p:cBhvr>
+                                    </p:animEffect>
+                                  </p:childTnLst>
+                                </p:cTn>
+                              </p:par>
+                            </p:childTnLst>
+                          </p:cTn>
+                        </p:par>
+                      </p:childTnLst>
+                    </p:cTn>
+                  </p:par>
+                  <p:par>
+                    <p:cTn id="11" fill="hold">
+                      <p:stCondLst>
+                        <p:cond delay="indefinite"/>
+                      </p:stCondLst>
+                      <p:childTnLst>
+                        <p:par>
+                          <p:cTn id="12" fill="hold">
+                            <p:stCondLst>
+                              <p:cond delay="0"/>
+                            </p:stCondLst>
+                            <p:childTnLst>
+                              <p:par>
+                                <p:cTn id="13" presetID="53" presetClass="entr" presetSubtype="16" fill="hold" nodeType="clickEffect">
+                                  <p:stCondLst>
+                                    <p:cond delay="0"/>
+                                  </p:stCondLst>
+                                  <p:childTnLst>
+                                    <p:set>
+                                      <p:cBhvr>
+                                        <p:cTn id="14" dur="1" fill="hold">
                                           <p:stCondLst>
                                             <p:cond delay="0"/>
                                           </p:stCondLst>
@@ -7915,7 +8933,7 @@
                                     </p:set>
                                     <p:anim calcmode="lin" valueType="num">
                                       <p:cBhvr>
-                                        <p:cTn id="7" dur="500" fill="hold"/>
+                                        <p:cTn id="15" dur="500" fill="hold"/>
                                         <p:tgtEl>
                                           <p:spTgt spid="13"/>
                                         </p:tgtEl>
@@ -7938,7 +8956,7 @@
                                     </p:anim>
                                     <p:anim calcmode="lin" valueType="num">
                                       <p:cBhvr>
-                                        <p:cTn id="8" dur="500" fill="hold"/>
+                                        <p:cTn id="16" dur="500" fill="hold"/>
                                         <p:tgtEl>
                                           <p:spTgt spid="13"/>
                                         </p:tgtEl>
@@ -7961,7 +8979,7 @@
                                     </p:anim>
                                     <p:animEffect transition="in" filter="fade">
                                       <p:cBhvr>
-                                        <p:cTn id="9" dur="500"/>
+                                        <p:cTn id="17" dur="500"/>
                                         <p:tgtEl>
                                           <p:spTgt spid="13"/>
                                         </p:tgtEl>
@@ -7977,26 +8995,26 @@
                     </p:cTn>
                   </p:par>
                   <p:par>
-                    <p:cTn id="10" fill="hold">
+                    <p:cTn id="18" fill="hold">
                       <p:stCondLst>
                         <p:cond delay="indefinite"/>
                       </p:stCondLst>
                       <p:childTnLst>
                         <p:par>
-                          <p:cTn id="11" fill="hold">
+                          <p:cTn id="19" fill="hold">
                             <p:stCondLst>
                               <p:cond delay="0"/>
                             </p:stCondLst>
                             <p:childTnLst>
                               <p:par>
-                                <p:cTn id="12" presetID="53" presetClass="entr" presetSubtype="16" fill="hold" nodeType="clickEffect">
+                                <p:cTn id="20" presetID="53" presetClass="entr" presetSubtype="16" fill="hold" nodeType="clickEffect">
                                   <p:stCondLst>
                                     <p:cond delay="0"/>
                                   </p:stCondLst>
                                   <p:childTnLst>
                                     <p:set>
                                       <p:cBhvr>
-                                        <p:cTn id="13" dur="1" fill="hold">
+                                        <p:cTn id="21" dur="1" fill="hold">
                                           <p:stCondLst>
                                             <p:cond delay="0"/>
                                           </p:stCondLst>
@@ -8014,7 +9032,7 @@
                                     </p:set>
                                     <p:anim calcmode="lin" valueType="num">
                                       <p:cBhvr>
-                                        <p:cTn id="14" dur="500" fill="hold"/>
+                                        <p:cTn id="22" dur="500" fill="hold"/>
                                         <p:tgtEl>
                                           <p:spTgt spid="14"/>
                                         </p:tgtEl>
@@ -8037,7 +9055,7 @@
                                     </p:anim>
                                     <p:anim calcmode="lin" valueType="num">
                                       <p:cBhvr>
-                                        <p:cTn id="15" dur="500" fill="hold"/>
+                                        <p:cTn id="23" dur="500" fill="hold"/>
                                         <p:tgtEl>
                                           <p:spTgt spid="14"/>
                                         </p:tgtEl>
@@ -8060,7 +9078,7 @@
                                     </p:anim>
                                     <p:animEffect transition="in" filter="fade">
                                       <p:cBhvr>
-                                        <p:cTn id="16" dur="500"/>
+                                        <p:cTn id="24" dur="500"/>
                                         <p:tgtEl>
                                           <p:spTgt spid="14"/>
                                         </p:tgtEl>
@@ -8096,11 +9114,249 @@
         </p:cTn>
       </p:par>
     </p:tnLst>
+    <p:bldLst>
+      <p:bldP spid="4" grpId="0" animBg="1"/>
+      <p:bldP spid="5" grpId="0" animBg="1"/>
+    </p:bldLst>
   </p:timing>
 </p:sld>
 </file>
 
-<file path=ppt/slides/slide3.xml><?xml version="1.0" encoding="utf-8"?>
+<file path=ppt/slides/slide4.xml><?xml version="1.0" encoding="utf-8"?>
+<p:sld xmlns:a="http://schemas.openxmlformats.org/drawingml/2006/main" xmlns:r="http://schemas.openxmlformats.org/officeDocument/2006/relationships" xmlns:p="http://schemas.openxmlformats.org/presentationml/2006/main">
+  <p:cSld>
+    <p:spTree>
+      <p:nvGrpSpPr>
+        <p:cNvPr id="1" name=""/>
+        <p:cNvGrpSpPr/>
+        <p:nvPr/>
+      </p:nvGrpSpPr>
+      <p:grpSpPr>
+        <a:xfrm>
+          <a:off x="0" y="0"/>
+          <a:ext cx="0" cy="0"/>
+          <a:chOff x="0" y="0"/>
+          <a:chExt cx="0" cy="0"/>
+        </a:xfrm>
+      </p:grpSpPr>
+      <p:sp>
+        <p:nvSpPr>
+          <p:cNvPr id="2" name="Title 1">
+            <a:extLst>
+              <a:ext uri="{FF2B5EF4-FFF2-40B4-BE49-F238E27FC236}">
+                <a16:creationId xmlns:a16="http://schemas.microsoft.com/office/drawing/2014/main" id="{01E3C672-DFE0-42B2-BEBA-C41AFB74A5E7}"/>
+              </a:ext>
+            </a:extLst>
+          </p:cNvPr>
+          <p:cNvSpPr>
+            <a:spLocks noGrp="1"/>
+          </p:cNvSpPr>
+          <p:nvPr>
+            <p:ph type="title"/>
+          </p:nvPr>
+        </p:nvSpPr>
+        <p:spPr/>
+        <p:txBody>
+          <a:bodyPr/>
+          <a:lstStyle/>
+          <a:p>
+            <a:r>
+              <a:rPr lang="en-US" dirty="0"/>
+              <a:t>Practice 1</a:t>
+            </a:r>
+          </a:p>
+        </p:txBody>
+      </p:sp>
+      <p:sp>
+        <p:nvSpPr>
+          <p:cNvPr id="3" name="Text Placeholder 2">
+            <a:extLst>
+              <a:ext uri="{FF2B5EF4-FFF2-40B4-BE49-F238E27FC236}">
+                <a16:creationId xmlns:a16="http://schemas.microsoft.com/office/drawing/2014/main" id="{AE49B175-2695-4C70-A436-77EA6F4E7007}"/>
+              </a:ext>
+            </a:extLst>
+          </p:cNvPr>
+          <p:cNvSpPr>
+            <a:spLocks noGrp="1"/>
+          </p:cNvSpPr>
+          <p:nvPr>
+            <p:ph type="body" sz="quarter" idx="10"/>
+          </p:nvPr>
+        </p:nvSpPr>
+        <p:spPr>
+          <a:xfrm>
+            <a:off x="628075" y="1776683"/>
+            <a:ext cx="12561453" cy="4805675"/>
+          </a:xfrm>
+        </p:spPr>
+        <p:txBody>
+          <a:bodyPr/>
+          <a:lstStyle/>
+          <a:p>
+            <a:r>
+              <a:rPr lang="en-US" dirty="0"/>
+              <a:t>Write an if/else statement that</a:t>
+            </a:r>
+          </a:p>
+          <a:p>
+            <a:pPr lvl="1"/>
+            <a:r>
+              <a:rPr lang="en-US" dirty="0"/>
+              <a:t>Checks to see if a </a:t>
+            </a:r>
+            <a:r>
+              <a:rPr lang="en-US" dirty="0" err="1"/>
+              <a:t>student_class</a:t>
+            </a:r>
+            <a:r>
+              <a:rPr lang="en-US" dirty="0"/>
+              <a:t> (String variable) is:</a:t>
+            </a:r>
+          </a:p>
+          <a:p>
+            <a:pPr lvl="2"/>
+            <a:r>
+              <a:rPr lang="en-US" dirty="0"/>
+              <a:t>“Fencing”</a:t>
+            </a:r>
+          </a:p>
+          <a:p>
+            <a:pPr lvl="3"/>
+            <a:r>
+              <a:rPr lang="en-US" dirty="0"/>
+              <a:t>Then set </a:t>
+            </a:r>
+            <a:r>
+              <a:rPr lang="en-US" dirty="0" err="1"/>
+              <a:t>meeting_info</a:t>
+            </a:r>
+            <a:r>
+              <a:rPr lang="en-US" dirty="0"/>
+              <a:t> (String variable) to “Wednesday, 4:30PM”</a:t>
+            </a:r>
+          </a:p>
+          <a:p>
+            <a:pPr lvl="2"/>
+            <a:r>
+              <a:rPr lang="en-US" dirty="0"/>
+              <a:t>“Boxing”</a:t>
+            </a:r>
+          </a:p>
+          <a:p>
+            <a:pPr lvl="3"/>
+            <a:r>
+              <a:rPr lang="en-US" dirty="0"/>
+              <a:t>Then set </a:t>
+            </a:r>
+            <a:r>
+              <a:rPr lang="en-US" dirty="0" err="1"/>
+              <a:t>meeting_info</a:t>
+            </a:r>
+            <a:r>
+              <a:rPr lang="en-US" dirty="0"/>
+              <a:t> (String variable) to “Thursday, “5:00 PM”</a:t>
+            </a:r>
+          </a:p>
+          <a:p>
+            <a:pPr lvl="2"/>
+            <a:r>
+              <a:rPr lang="en-US" dirty="0"/>
+              <a:t>“Aikido”</a:t>
+            </a:r>
+          </a:p>
+          <a:p>
+            <a:pPr lvl="3"/>
+            <a:r>
+              <a:rPr lang="en-US" dirty="0"/>
+              <a:t>Then set </a:t>
+            </a:r>
+            <a:r>
+              <a:rPr lang="en-US" dirty="0" err="1"/>
+              <a:t>meeting_info</a:t>
+            </a:r>
+            <a:r>
+              <a:rPr lang="en-US" dirty="0"/>
+              <a:t> (String variable) to “Monday, 6:00 AM”</a:t>
+            </a:r>
+          </a:p>
+          <a:p>
+            <a:pPr lvl="2"/>
+            <a:r>
+              <a:rPr lang="en-US" dirty="0"/>
+              <a:t>“Nothing” or null </a:t>
+            </a:r>
+          </a:p>
+          <a:p>
+            <a:pPr lvl="3"/>
+            <a:r>
+              <a:rPr lang="en-US" dirty="0"/>
+              <a:t>Then set </a:t>
+            </a:r>
+            <a:r>
+              <a:rPr lang="en-US" dirty="0" err="1"/>
+              <a:t>meeting_info</a:t>
+            </a:r>
+            <a:r>
+              <a:rPr lang="en-US" dirty="0"/>
+              <a:t> to the empty String (“”)</a:t>
+            </a:r>
+          </a:p>
+          <a:p>
+            <a:r>
+              <a:rPr lang="en-US" dirty="0"/>
+              <a:t>Now write the same statement as a switch statement</a:t>
+            </a:r>
+          </a:p>
+          <a:p>
+            <a:r>
+              <a:rPr lang="en-US" dirty="0"/>
+              <a:t>May be easier to write this as two separate methods (</a:t>
+            </a:r>
+            <a:r>
+              <a:rPr lang="en-US" dirty="0" err="1"/>
+              <a:t>if_option</a:t>
+            </a:r>
+            <a:r>
+              <a:rPr lang="en-US" dirty="0"/>
+              <a:t>, </a:t>
+            </a:r>
+            <a:r>
+              <a:rPr lang="en-US" dirty="0" err="1"/>
+              <a:t>switch_option</a:t>
+            </a:r>
+            <a:r>
+              <a:rPr lang="en-US" dirty="0"/>
+              <a:t>)</a:t>
+            </a:r>
+          </a:p>
+        </p:txBody>
+      </p:sp>
+    </p:spTree>
+    <p:extLst>
+      <p:ext uri="{BB962C8B-B14F-4D97-AF65-F5344CB8AC3E}">
+        <p14:creationId xmlns:p14="http://schemas.microsoft.com/office/powerpoint/2010/main" val="2465048228"/>
+      </p:ext>
+    </p:extLst>
+  </p:cSld>
+  <p:clrMapOvr>
+    <a:masterClrMapping/>
+  </p:clrMapOvr>
+  <mc:AlternateContent xmlns:mc="http://schemas.openxmlformats.org/markup-compatibility/2006" xmlns:p14="http://schemas.microsoft.com/office/powerpoint/2010/main">
+    <mc:Choice Requires="p14">
+      <p:transition p14:dur="300">
+        <p:fade/>
+      </p:transition>
+    </mc:Choice>
+    <mc:Fallback xmlns="">
+      <p:transition>
+        <p:fade/>
+      </p:transition>
+    </mc:Fallback>
+  </mc:AlternateContent>
+</p:sld>
+</file>
+
+<file path=ppt/slides/slide5.xml><?xml version="1.0" encoding="utf-8"?>
 <p:sld xmlns:a="http://schemas.openxmlformats.org/drawingml/2006/main" xmlns:r="http://schemas.openxmlformats.org/officeDocument/2006/relationships" xmlns:p="http://schemas.openxmlformats.org/presentationml/2006/main">
   <p:cSld>
     <p:spTree>
@@ -8434,7 +9690,7 @@
 </p:sld>
 </file>
 
-<file path=ppt/slides/slide4.xml><?xml version="1.0" encoding="utf-8"?>
+<file path=ppt/slides/slide6.xml><?xml version="1.0" encoding="utf-8"?>
 <p:sld xmlns:a="http://schemas.openxmlformats.org/drawingml/2006/main" xmlns:r="http://schemas.openxmlformats.org/officeDocument/2006/relationships" xmlns:p="http://schemas.openxmlformats.org/presentationml/2006/main">
   <p:cSld>
     <p:spTree>
@@ -9635,6 +10891,242 @@
     <p:extLst>
       <p:ext uri="{BB962C8B-B14F-4D97-AF65-F5344CB8AC3E}">
         <p14:creationId xmlns:p14="http://schemas.microsoft.com/office/powerpoint/2010/main" val="2591500199"/>
+      </p:ext>
+    </p:extLst>
+  </p:cSld>
+  <p:clrMapOvr>
+    <a:masterClrMapping/>
+  </p:clrMapOvr>
+  <mc:AlternateContent xmlns:mc="http://schemas.openxmlformats.org/markup-compatibility/2006" xmlns:p14="http://schemas.microsoft.com/office/powerpoint/2010/main">
+    <mc:Choice Requires="p14">
+      <p:transition p14:dur="300">
+        <p:fade/>
+      </p:transition>
+    </mc:Choice>
+    <mc:Fallback xmlns="">
+      <p:transition>
+        <p:fade/>
+      </p:transition>
+    </mc:Fallback>
+  </mc:AlternateContent>
+</p:sld>
+</file>
+
+<file path=ppt/slides/slide7.xml><?xml version="1.0" encoding="utf-8"?>
+<p:sld xmlns:a="http://schemas.openxmlformats.org/drawingml/2006/main" xmlns:r="http://schemas.openxmlformats.org/officeDocument/2006/relationships" xmlns:p="http://schemas.openxmlformats.org/presentationml/2006/main">
+  <p:cSld>
+    <p:spTree>
+      <p:nvGrpSpPr>
+        <p:cNvPr id="1" name=""/>
+        <p:cNvGrpSpPr/>
+        <p:nvPr/>
+      </p:nvGrpSpPr>
+      <p:grpSpPr>
+        <a:xfrm>
+          <a:off x="0" y="0"/>
+          <a:ext cx="0" cy="0"/>
+          <a:chOff x="0" y="0"/>
+          <a:chExt cx="0" cy="0"/>
+        </a:xfrm>
+      </p:grpSpPr>
+      <p:sp>
+        <p:nvSpPr>
+          <p:cNvPr id="2" name="Title 1">
+            <a:extLst>
+              <a:ext uri="{FF2B5EF4-FFF2-40B4-BE49-F238E27FC236}">
+                <a16:creationId xmlns:a16="http://schemas.microsoft.com/office/drawing/2014/main" id="{158CF91B-5EEF-4E33-B6B8-3D7CC1B262E4}"/>
+              </a:ext>
+            </a:extLst>
+          </p:cNvPr>
+          <p:cNvSpPr>
+            <a:spLocks noGrp="1"/>
+          </p:cNvSpPr>
+          <p:nvPr>
+            <p:ph type="title"/>
+          </p:nvPr>
+        </p:nvSpPr>
+        <p:spPr/>
+        <p:txBody>
+          <a:bodyPr/>
+          <a:lstStyle/>
+          <a:p>
+            <a:r>
+              <a:rPr lang="en-US" dirty="0"/>
+              <a:t>Student Practice</a:t>
+            </a:r>
+          </a:p>
+        </p:txBody>
+      </p:sp>
+      <p:sp>
+        <p:nvSpPr>
+          <p:cNvPr id="3" name="Text Placeholder 2">
+            <a:extLst>
+              <a:ext uri="{FF2B5EF4-FFF2-40B4-BE49-F238E27FC236}">
+                <a16:creationId xmlns:a16="http://schemas.microsoft.com/office/drawing/2014/main" id="{C9F22177-DC83-4985-A222-DE19B72037AC}"/>
+              </a:ext>
+            </a:extLst>
+          </p:cNvPr>
+          <p:cNvSpPr>
+            <a:spLocks noGrp="1"/>
+          </p:cNvSpPr>
+          <p:nvPr>
+            <p:ph type="body" sz="quarter" idx="10"/>
+          </p:nvPr>
+        </p:nvSpPr>
+        <p:spPr>
+          <a:xfrm>
+            <a:off x="628075" y="1776683"/>
+            <a:ext cx="12561453" cy="3802323"/>
+          </a:xfrm>
+        </p:spPr>
+        <p:txBody>
+          <a:bodyPr/>
+          <a:lstStyle/>
+          <a:p>
+            <a:r>
+              <a:rPr lang="en-US" dirty="0"/>
+              <a:t>Write an </a:t>
+            </a:r>
+            <a:r>
+              <a:rPr lang="en-US" dirty="0" err="1"/>
+              <a:t>enum</a:t>
+            </a:r>
+            <a:r>
+              <a:rPr lang="en-US" dirty="0"/>
+              <a:t> called </a:t>
+            </a:r>
+            <a:r>
+              <a:rPr lang="en-US" dirty="0" err="1"/>
+              <a:t>DiceType</a:t>
+            </a:r>
+            <a:endParaRPr lang="en-US" dirty="0"/>
+          </a:p>
+          <a:p>
+            <a:pPr lvl="1"/>
+            <a:r>
+              <a:rPr lang="en-US" dirty="0"/>
+              <a:t>Contains d4, d6, d8</a:t>
+            </a:r>
+          </a:p>
+          <a:p>
+            <a:r>
+              <a:rPr lang="en-US" dirty="0"/>
+              <a:t>Write a switch statement that takes in the </a:t>
+            </a:r>
+            <a:r>
+              <a:rPr lang="en-US" dirty="0" err="1"/>
+              <a:t>enum</a:t>
+            </a:r>
+            <a:r>
+              <a:rPr lang="en-US" dirty="0"/>
+              <a:t>:</a:t>
+            </a:r>
+          </a:p>
+          <a:p>
+            <a:pPr lvl="1"/>
+            <a:r>
+              <a:rPr lang="en-US" dirty="0"/>
+              <a:t>d4  - random number between 1-4</a:t>
+            </a:r>
+          </a:p>
+          <a:p>
+            <a:pPr lvl="1"/>
+            <a:r>
+              <a:rPr lang="en-US" dirty="0"/>
+              <a:t>d6 – random number between 1-6</a:t>
+            </a:r>
+          </a:p>
+          <a:p>
+            <a:pPr lvl="1"/>
+            <a:r>
+              <a:rPr lang="en-US" dirty="0"/>
+              <a:t>d8 – random number between 1-8</a:t>
+            </a:r>
+          </a:p>
+          <a:p>
+            <a:pPr lvl="1"/>
+            <a:r>
+              <a:rPr lang="en-US" dirty="0"/>
+              <a:t>Default – </a:t>
+            </a:r>
+            <a:r>
+              <a:rPr lang="en-US" dirty="0" err="1"/>
+              <a:t>randon</a:t>
+            </a:r>
+            <a:r>
+              <a:rPr lang="en-US" dirty="0"/>
+              <a:t> number between 1-20</a:t>
+            </a:r>
+          </a:p>
+          <a:p>
+            <a:r>
+              <a:rPr lang="en-US" dirty="0"/>
+              <a:t>Remember, Random </a:t>
+            </a:r>
+            <a:r>
+              <a:rPr lang="en-US" dirty="0" err="1"/>
+              <a:t>rnd</a:t>
+            </a:r>
+            <a:r>
+              <a:rPr lang="en-US" dirty="0"/>
+              <a:t> = new Random(); and </a:t>
+            </a:r>
+            <a:r>
+              <a:rPr lang="en-US" dirty="0" err="1"/>
+              <a:t>rnd.nextInt</a:t>
+            </a:r>
+            <a:r>
+              <a:rPr lang="en-US" dirty="0"/>
+              <a:t>(6) // returns a range from 0-5</a:t>
+            </a:r>
+          </a:p>
+          <a:p>
+            <a:r>
+              <a:rPr lang="en-US" dirty="0"/>
+              <a:t>How do you test this?</a:t>
+            </a:r>
+          </a:p>
+        </p:txBody>
+      </p:sp>
+      <p:sp>
+        <p:nvSpPr>
+          <p:cNvPr id="4" name="TextBox 3">
+            <a:extLst>
+              <a:ext uri="{FF2B5EF4-FFF2-40B4-BE49-F238E27FC236}">
+                <a16:creationId xmlns:a16="http://schemas.microsoft.com/office/drawing/2014/main" id="{00E026F7-AACB-4A28-BA90-3CC883972E5E}"/>
+              </a:ext>
+            </a:extLst>
+          </p:cNvPr>
+          <p:cNvSpPr txBox="1"/>
+          <p:nvPr/>
+        </p:nvSpPr>
+        <p:spPr>
+          <a:xfrm>
+            <a:off x="8374743" y="6656853"/>
+            <a:ext cx="4814785" cy="707886"/>
+          </a:xfrm>
+          <a:prstGeom prst="rect">
+            <a:avLst/>
+          </a:prstGeom>
+          <a:noFill/>
+        </p:spPr>
+        <p:txBody>
+          <a:bodyPr wrap="square" rtlCol="0">
+            <a:spAutoFit/>
+          </a:bodyPr>
+          <a:lstStyle/>
+          <a:p>
+            <a:r>
+              <a:rPr lang="en-US" dirty="0"/>
+              <a:t>You may come back to this in a week when you start Practical 5...</a:t>
+            </a:r>
+          </a:p>
+        </p:txBody>
+      </p:sp>
+    </p:spTree>
+    <p:extLst>
+      <p:ext uri="{BB962C8B-B14F-4D97-AF65-F5344CB8AC3E}">
+        <p14:creationId xmlns:p14="http://schemas.microsoft.com/office/powerpoint/2010/main" val="589670357"/>
       </p:ext>
     </p:extLst>
   </p:cSld>

</xml_diff>